<commit_message>
Correcciones a la clase 4
</commit_message>
<xml_diff>
--- a/clase-4/UNI-Curso-Analisis-Datos-Clase-4.pptx
+++ b/clase-4/UNI-Curso-Analisis-Datos-Clase-4.pptx
@@ -6831,7 +6831,11 @@
             </a:r>
             <a:r>
               <a:rPr lang="en-US" dirty="0" smtClean="0"/>
-              <a:t> - 2018</a:t>
+              <a:t> - </a:t>
+            </a:r>
+            <a:r>
+              <a:rPr lang="en-US" dirty="0" smtClean="0"/>
+              <a:t>2019</a:t>
             </a:r>
             <a:endParaRPr lang="en-US" dirty="0"/>
           </a:p>
@@ -7238,7 +7242,7 @@
           <a:p>
             <a:r>
               <a:rPr lang="es-ES_tradnl" dirty="0" smtClean="0"/>
-              <a:t>Ventanas Emergentes.</a:t>
+              <a:t>Ventanas Emergentes</a:t>
             </a:r>
             <a:endParaRPr lang="es-ES_tradnl" dirty="0" smtClean="0"/>
           </a:p>
@@ -8324,148 +8328,27 @@
             <a:pPr lvl="1"/>
             <a:r>
               <a:rPr lang="es-ES_tradnl" dirty="0"/>
-              <a:t>Utilizando archivo “SuperTienda-2013.xlsx”</a:t>
+              <a:t>Utilizando archivo “</a:t>
+            </a:r>
+            <a:r>
+              <a:rPr lang="es-ES_tradnl" dirty="0" smtClean="0"/>
+              <a:t>SuperTienda-2013.xlsx”</a:t>
             </a:r>
           </a:p>
           <a:p>
             <a:pPr lvl="1"/>
             <a:r>
-              <a:rPr lang="es-ES_tradnl" dirty="0"/>
-              <a:t>Encontrar el cliente con la mayor ganancia (</a:t>
-            </a:r>
-            <a:r>
-              <a:rPr lang="es-ES_tradnl" dirty="0" err="1"/>
-              <a:t>profit</a:t>
-            </a:r>
-            <a:r>
-              <a:rPr lang="es-ES_tradnl" dirty="0"/>
-              <a:t>). Cual es su precio promedio de costo de </a:t>
-            </a:r>
-            <a:r>
               <a:rPr lang="es-ES_tradnl" dirty="0" smtClean="0"/>
-              <a:t>envió </a:t>
-            </a:r>
-            <a:r>
-              <a:rPr lang="es-ES_tradnl" dirty="0"/>
-              <a:t>(</a:t>
-            </a:r>
-            <a:r>
-              <a:rPr lang="es-ES_tradnl" dirty="0" err="1"/>
-              <a:t>shipping</a:t>
-            </a:r>
-            <a:r>
-              <a:rPr lang="es-ES_tradnl" dirty="0"/>
-              <a:t> </a:t>
-            </a:r>
-            <a:r>
-              <a:rPr lang="es-ES_tradnl" dirty="0" err="1"/>
-              <a:t>cost</a:t>
-            </a:r>
-            <a:r>
-              <a:rPr lang="es-ES_tradnl" dirty="0"/>
-              <a:t>) por orden (</a:t>
-            </a:r>
-            <a:r>
-              <a:rPr lang="es-ES_tradnl" dirty="0" err="1"/>
-              <a:t>order</a:t>
-            </a:r>
-            <a:r>
-              <a:rPr lang="es-ES_tradnl" dirty="0"/>
-              <a:t>)?Ayuda: para calcular el costo de </a:t>
-            </a:r>
+              <a:t>Generar un grafico mapa por estado, dando colores por cantidad de ventas.</a:t>
+            </a:r>
+          </a:p>
+          <a:p>
+            <a:pPr lvl="1"/>
             <a:r>
               <a:rPr lang="es-ES_tradnl" dirty="0" smtClean="0"/>
-              <a:t>envió </a:t>
-            </a:r>
-            <a:r>
-              <a:rPr lang="es-ES_tradnl" dirty="0"/>
-              <a:t>(</a:t>
-            </a:r>
-            <a:r>
-              <a:rPr lang="es-ES_tradnl" dirty="0" err="1"/>
-              <a:t>shipping</a:t>
-            </a:r>
-            <a:r>
-              <a:rPr lang="es-ES_tradnl" dirty="0"/>
-              <a:t> </a:t>
-            </a:r>
-            <a:r>
-              <a:rPr lang="es-ES_tradnl" dirty="0" err="1"/>
-              <a:t>cost</a:t>
-            </a:r>
-            <a:r>
-              <a:rPr lang="es-ES_tradnl" dirty="0"/>
-              <a:t>) por </a:t>
-            </a:r>
-            <a:r>
-              <a:rPr lang="es-ES_tradnl" dirty="0" err="1"/>
-              <a:t>order</a:t>
-            </a:r>
-            <a:r>
-              <a:rPr lang="es-ES_tradnl" dirty="0"/>
-              <a:t>, </a:t>
-            </a:r>
-            <a:r>
-              <a:rPr lang="es-ES_tradnl" dirty="0" smtClean="0"/>
-              <a:t>será </a:t>
-            </a:r>
-            <a:r>
-              <a:rPr lang="es-ES_tradnl" dirty="0"/>
-              <a:t>necesario calcular el numero de ordenes utilizando la </a:t>
-            </a:r>
-            <a:r>
-              <a:rPr lang="es-ES_tradnl" dirty="0" smtClean="0"/>
-              <a:t>función </a:t>
-            </a:r>
-            <a:r>
-              <a:rPr lang="es-ES_tradnl" dirty="0"/>
-              <a:t>(</a:t>
-            </a:r>
-            <a:r>
-              <a:rPr lang="es-ES_tradnl" dirty="0" err="1"/>
-              <a:t>count</a:t>
-            </a:r>
-            <a:r>
-              <a:rPr lang="es-ES_tradnl" dirty="0"/>
-              <a:t> </a:t>
-            </a:r>
-            <a:r>
-              <a:rPr lang="es-ES_tradnl" dirty="0" err="1"/>
-              <a:t>distinct</a:t>
-            </a:r>
-            <a:r>
-              <a:rPr lang="es-ES_tradnl" dirty="0" smtClean="0"/>
-              <a:t>)</a:t>
-            </a:r>
-          </a:p>
-          <a:p>
-            <a:pPr lvl="2"/>
-            <a:r>
-              <a:rPr lang="es-ES_tradnl" dirty="0" smtClean="0"/>
-              <a:t>66.72</a:t>
-            </a:r>
-          </a:p>
-          <a:p>
-            <a:pPr lvl="2"/>
-            <a:r>
-              <a:rPr lang="es-ES_tradnl" dirty="0" smtClean="0"/>
-              <a:t>10.49</a:t>
-            </a:r>
-          </a:p>
-          <a:p>
-            <a:pPr lvl="2"/>
-            <a:r>
-              <a:rPr lang="es-ES_tradnl" dirty="0" smtClean="0"/>
-              <a:t>12.59</a:t>
-            </a:r>
-          </a:p>
-          <a:p>
-            <a:pPr lvl="2"/>
-            <a:r>
-              <a:rPr lang="es-ES_tradnl" dirty="0" smtClean="0"/>
-              <a:t>12.18</a:t>
-            </a:r>
-            <a:endParaRPr lang="is-IS" dirty="0" smtClean="0"/>
+              <a:t>Al posicionarse sobre un estado en particular. Mostrar las ventas de dicho estado por subcategorías en una ventana emergente.</a:t>
+            </a:r>
+            <a:endParaRPr lang="es-ES_tradnl" dirty="0"/>
           </a:p>
         </p:txBody>
       </p:sp>

</xml_diff>